<commit_message>
Deploy website - based on a6313fcbc5aadea2b0c5a537248690b9e228949f
</commit_message>
<xml_diff>
--- a/assets/_ews_Image.pptx
+++ b/assets/_ews_Image.pptx
@@ -227,7 +227,7 @@
           <a:p>
             <a:fld id="{CABFA58B-201B-41D2-AA3E-28483B84FD7B}" type="datetimeFigureOut">
               <a:rPr lang="ko-KR" altLang="en-US" smtClean="0"/>
-              <a:t>2021-10-09</a:t>
+              <a:t>2022-11-22</a:t>
             </a:fld>
             <a:endParaRPr lang="ko-KR" altLang="en-US"/>
           </a:p>
@@ -921,7 +921,7 @@
           <a:p>
             <a:fld id="{C33163C4-65CF-48D2-8124-E2CEDBD7A0C5}" type="datetimeFigureOut">
               <a:rPr lang="ko-KR" altLang="en-US" smtClean="0"/>
-              <a:t>2021-10-09</a:t>
+              <a:t>2022-11-22</a:t>
             </a:fld>
             <a:endParaRPr lang="ko-KR" altLang="en-US"/>
           </a:p>
@@ -1243,7 +1243,7 @@
           <a:p>
             <a:fld id="{C33163C4-65CF-48D2-8124-E2CEDBD7A0C5}" type="datetimeFigureOut">
               <a:rPr lang="ko-KR" altLang="en-US" smtClean="0"/>
-              <a:t>2021-10-09</a:t>
+              <a:t>2022-11-22</a:t>
             </a:fld>
             <a:endParaRPr lang="ko-KR" altLang="en-US"/>
           </a:p>
@@ -1421,7 +1421,7 @@
           <a:p>
             <a:fld id="{C33163C4-65CF-48D2-8124-E2CEDBD7A0C5}" type="datetimeFigureOut">
               <a:rPr lang="ko-KR" altLang="en-US" smtClean="0"/>
-              <a:t>2021-10-09</a:t>
+              <a:t>2022-11-22</a:t>
             </a:fld>
             <a:endParaRPr lang="ko-KR" altLang="en-US"/>
           </a:p>
@@ -1661,7 +1661,7 @@
           <a:p>
             <a:fld id="{29936F60-83FB-4643-B7D2-F169DF4090A4}" type="datetimeFigureOut">
               <a:rPr lang="ko-KR" altLang="en-US" smtClean="0"/>
-              <a:t>2021-10-09</a:t>
+              <a:t>2022-11-22</a:t>
             </a:fld>
             <a:endParaRPr lang="ko-KR" altLang="en-US"/>
           </a:p>
@@ -1829,7 +1829,7 @@
           <a:p>
             <a:fld id="{29936F60-83FB-4643-B7D2-F169DF4090A4}" type="datetimeFigureOut">
               <a:rPr lang="ko-KR" altLang="en-US" smtClean="0"/>
-              <a:t>2021-10-09</a:t>
+              <a:t>2022-11-22</a:t>
             </a:fld>
             <a:endParaRPr lang="ko-KR" altLang="en-US"/>
           </a:p>
@@ -2074,7 +2074,7 @@
           <a:p>
             <a:fld id="{29936F60-83FB-4643-B7D2-F169DF4090A4}" type="datetimeFigureOut">
               <a:rPr lang="ko-KR" altLang="en-US" smtClean="0"/>
-              <a:t>2021-10-09</a:t>
+              <a:t>2022-11-22</a:t>
             </a:fld>
             <a:endParaRPr lang="ko-KR" altLang="en-US"/>
           </a:p>
@@ -2359,7 +2359,7 @@
           <a:p>
             <a:fld id="{29936F60-83FB-4643-B7D2-F169DF4090A4}" type="datetimeFigureOut">
               <a:rPr lang="ko-KR" altLang="en-US" smtClean="0"/>
-              <a:t>2021-10-09</a:t>
+              <a:t>2022-11-22</a:t>
             </a:fld>
             <a:endParaRPr lang="ko-KR" altLang="en-US"/>
           </a:p>
@@ -2778,7 +2778,7 @@
           <a:p>
             <a:fld id="{29936F60-83FB-4643-B7D2-F169DF4090A4}" type="datetimeFigureOut">
               <a:rPr lang="ko-KR" altLang="en-US" smtClean="0"/>
-              <a:t>2021-10-09</a:t>
+              <a:t>2022-11-22</a:t>
             </a:fld>
             <a:endParaRPr lang="ko-KR" altLang="en-US"/>
           </a:p>
@@ -2895,7 +2895,7 @@
           <a:p>
             <a:fld id="{29936F60-83FB-4643-B7D2-F169DF4090A4}" type="datetimeFigureOut">
               <a:rPr lang="ko-KR" altLang="en-US" smtClean="0"/>
-              <a:t>2021-10-09</a:t>
+              <a:t>2022-11-22</a:t>
             </a:fld>
             <a:endParaRPr lang="ko-KR" altLang="en-US"/>
           </a:p>
@@ -2990,7 +2990,7 @@
           <a:p>
             <a:fld id="{29936F60-83FB-4643-B7D2-F169DF4090A4}" type="datetimeFigureOut">
               <a:rPr lang="ko-KR" altLang="en-US" smtClean="0"/>
-              <a:t>2021-10-09</a:t>
+              <a:t>2022-11-22</a:t>
             </a:fld>
             <a:endParaRPr lang="ko-KR" altLang="en-US"/>
           </a:p>
@@ -3265,7 +3265,7 @@
           <a:p>
             <a:fld id="{29936F60-83FB-4643-B7D2-F169DF4090A4}" type="datetimeFigureOut">
               <a:rPr lang="ko-KR" altLang="en-US" smtClean="0"/>
-              <a:t>2021-10-09</a:t>
+              <a:t>2022-11-22</a:t>
             </a:fld>
             <a:endParaRPr lang="ko-KR" altLang="en-US"/>
           </a:p>
@@ -3455,7 +3455,7 @@
           <a:p>
             <a:fld id="{C33163C4-65CF-48D2-8124-E2CEDBD7A0C5}" type="datetimeFigureOut">
               <a:rPr lang="ko-KR" altLang="en-US" smtClean="0"/>
-              <a:t>2021-10-09</a:t>
+              <a:t>2022-11-22</a:t>
             </a:fld>
             <a:endParaRPr lang="ko-KR" altLang="en-US"/>
           </a:p>
@@ -4068,7 +4068,7 @@
           <a:p>
             <a:fld id="{29936F60-83FB-4643-B7D2-F169DF4090A4}" type="datetimeFigureOut">
               <a:rPr lang="ko-KR" altLang="en-US" smtClean="0"/>
-              <a:t>2021-10-09</a:t>
+              <a:t>2022-11-22</a:t>
             </a:fld>
             <a:endParaRPr lang="ko-KR" altLang="en-US"/>
           </a:p>
@@ -4236,7 +4236,7 @@
           <a:p>
             <a:fld id="{29936F60-83FB-4643-B7D2-F169DF4090A4}" type="datetimeFigureOut">
               <a:rPr lang="ko-KR" altLang="en-US" smtClean="0"/>
-              <a:t>2021-10-09</a:t>
+              <a:t>2022-11-22</a:t>
             </a:fld>
             <a:endParaRPr lang="ko-KR" altLang="en-US"/>
           </a:p>
@@ -4414,7 +4414,7 @@
           <a:p>
             <a:fld id="{29936F60-83FB-4643-B7D2-F169DF4090A4}" type="datetimeFigureOut">
               <a:rPr lang="ko-KR" altLang="en-US" smtClean="0"/>
-              <a:t>2021-10-09</a:t>
+              <a:t>2022-11-22</a:t>
             </a:fld>
             <a:endParaRPr lang="ko-KR" altLang="en-US"/>
           </a:p>
@@ -4659,7 +4659,7 @@
           <a:p>
             <a:fld id="{C33163C4-65CF-48D2-8124-E2CEDBD7A0C5}" type="datetimeFigureOut">
               <a:rPr lang="ko-KR" altLang="en-US" smtClean="0"/>
-              <a:t>2021-10-09</a:t>
+              <a:t>2022-11-22</a:t>
             </a:fld>
             <a:endParaRPr lang="ko-KR" altLang="en-US"/>
           </a:p>
@@ -4785,7 +4785,7 @@
           <a:p>
             <a:fld id="{C33163C4-65CF-48D2-8124-E2CEDBD7A0C5}" type="datetimeFigureOut">
               <a:rPr lang="ko-KR" altLang="en-US" smtClean="0"/>
-              <a:t>2021-10-09</a:t>
+              <a:t>2022-11-22</a:t>
             </a:fld>
             <a:endParaRPr lang="ko-KR" altLang="en-US"/>
           </a:p>
@@ -5688,7 +5688,7 @@
           <a:p>
             <a:fld id="{C33163C4-65CF-48D2-8124-E2CEDBD7A0C5}" type="datetimeFigureOut">
               <a:rPr lang="ko-KR" altLang="en-US" smtClean="0"/>
-              <a:t>2021-10-09</a:t>
+              <a:t>2022-11-22</a:t>
             </a:fld>
             <a:endParaRPr lang="ko-KR" altLang="en-US"/>
           </a:p>
@@ -5805,7 +5805,7 @@
           <a:p>
             <a:fld id="{C33163C4-65CF-48D2-8124-E2CEDBD7A0C5}" type="datetimeFigureOut">
               <a:rPr lang="ko-KR" altLang="en-US" smtClean="0"/>
-              <a:t>2021-10-09</a:t>
+              <a:t>2022-11-22</a:t>
             </a:fld>
             <a:endParaRPr lang="ko-KR" altLang="en-US"/>
           </a:p>
@@ -5900,7 +5900,7 @@
           <a:p>
             <a:fld id="{C33163C4-65CF-48D2-8124-E2CEDBD7A0C5}" type="datetimeFigureOut">
               <a:rPr lang="ko-KR" altLang="en-US" smtClean="0"/>
-              <a:t>2021-10-09</a:t>
+              <a:t>2022-11-22</a:t>
             </a:fld>
             <a:endParaRPr lang="ko-KR" altLang="en-US"/>
           </a:p>
@@ -6175,7 +6175,7 @@
           <a:p>
             <a:fld id="{C33163C4-65CF-48D2-8124-E2CEDBD7A0C5}" type="datetimeFigureOut">
               <a:rPr lang="ko-KR" altLang="en-US" smtClean="0"/>
-              <a:t>2021-10-09</a:t>
+              <a:t>2022-11-22</a:t>
             </a:fld>
             <a:endParaRPr lang="ko-KR" altLang="en-US"/>
           </a:p>
@@ -6427,7 +6427,7 @@
           <a:p>
             <a:fld id="{C33163C4-65CF-48D2-8124-E2CEDBD7A0C5}" type="datetimeFigureOut">
               <a:rPr lang="ko-KR" altLang="en-US" smtClean="0"/>
-              <a:t>2021-10-09</a:t>
+              <a:t>2022-11-22</a:t>
             </a:fld>
             <a:endParaRPr lang="ko-KR" altLang="en-US"/>
           </a:p>
@@ -6662,7 +6662,7 @@
           <a:p>
             <a:fld id="{C33163C4-65CF-48D2-8124-E2CEDBD7A0C5}" type="datetimeFigureOut">
               <a:rPr lang="ko-KR" altLang="en-US" smtClean="0"/>
-              <a:t>2021-10-09</a:t>
+              <a:t>2022-11-22</a:t>
             </a:fld>
             <a:endParaRPr lang="ko-KR" altLang="en-US"/>
           </a:p>
@@ -7172,7 +7172,7 @@
           <a:p>
             <a:fld id="{29936F60-83FB-4643-B7D2-F169DF4090A4}" type="datetimeFigureOut">
               <a:rPr lang="ko-KR" altLang="en-US" smtClean="0"/>
-              <a:t>2021-10-09</a:t>
+              <a:t>2022-11-22</a:t>
             </a:fld>
             <a:endParaRPr lang="ko-KR" altLang="en-US"/>
           </a:p>
@@ -12740,7 +12740,7 @@
         </p:nvGrpSpPr>
         <p:grpSpPr>
           <a:xfrm>
-            <a:off x="5416860" y="3887577"/>
+            <a:off x="1295128" y="1798991"/>
             <a:ext cx="4048052" cy="4750188"/>
             <a:chOff x="5416860" y="3887577"/>
             <a:chExt cx="4048052" cy="4750188"/>
@@ -13649,6 +13649,288 @@
                     <a:lumMod val="65000"/>
                     <a:lumOff val="35000"/>
                   </a:schemeClr>
+                </a:solidFill>
+              </a:endParaRPr>
+            </a:p>
+          </p:txBody>
+        </p:sp>
+      </p:grpSp>
+      <p:grpSp>
+        <p:nvGrpSpPr>
+          <p:cNvPr id="44" name="그룹 43"/>
+          <p:cNvGrpSpPr/>
+          <p:nvPr/>
+        </p:nvGrpSpPr>
+        <p:grpSpPr>
+          <a:xfrm>
+            <a:off x="6704554" y="5183721"/>
+            <a:ext cx="4169446" cy="3228811"/>
+            <a:chOff x="6704554" y="5183721"/>
+            <a:chExt cx="4169446" cy="3228811"/>
+          </a:xfrm>
+        </p:grpSpPr>
+        <p:grpSp>
+          <p:nvGrpSpPr>
+            <p:cNvPr id="41" name="그룹 40"/>
+            <p:cNvGrpSpPr>
+              <a:grpSpLocks noChangeAspect="1"/>
+            </p:cNvGrpSpPr>
+            <p:nvPr/>
+          </p:nvGrpSpPr>
+          <p:grpSpPr>
+            <a:xfrm>
+              <a:off x="6704554" y="5183721"/>
+              <a:ext cx="4169446" cy="3228811"/>
+              <a:chOff x="6704553" y="5079033"/>
+              <a:chExt cx="8559204" cy="6628231"/>
+            </a:xfrm>
+          </p:grpSpPr>
+          <p:grpSp>
+            <p:nvGrpSpPr>
+              <p:cNvPr id="40" name="그룹 39"/>
+              <p:cNvGrpSpPr/>
+              <p:nvPr/>
+            </p:nvGrpSpPr>
+            <p:grpSpPr>
+              <a:xfrm>
+                <a:off x="6704553" y="5079033"/>
+                <a:ext cx="8559204" cy="5267317"/>
+                <a:chOff x="6704553" y="5079033"/>
+                <a:chExt cx="8559204" cy="5267317"/>
+              </a:xfrm>
+            </p:grpSpPr>
+            <p:pic>
+              <p:nvPicPr>
+                <p:cNvPr id="38" name="그림 37">
+                  <a:extLst>
+                    <a:ext uri="{FF2B5EF4-FFF2-40B4-BE49-F238E27FC236}">
+                      <a16:creationId xmlns:a16="http://schemas.microsoft.com/office/drawing/2014/main" id="{6D8ECECD-9898-4939-8106-C8F80990C495}"/>
+                    </a:ext>
+                  </a:extLst>
+                </p:cNvPr>
+                <p:cNvPicPr>
+                  <a:picLocks noChangeAspect="1"/>
+                </p:cNvPicPr>
+                <p:nvPr/>
+              </p:nvPicPr>
+              <p:blipFill>
+                <a:blip r:embed="rId2"/>
+                <a:stretch>
+                  <a:fillRect/>
+                </a:stretch>
+              </p:blipFill>
+              <p:spPr>
+                <a:xfrm>
+                  <a:off x="6704553" y="5079033"/>
+                  <a:ext cx="6061876" cy="5267317"/>
+                </a:xfrm>
+                <a:prstGeom prst="rect">
+                  <a:avLst/>
+                </a:prstGeom>
+              </p:spPr>
+            </p:pic>
+            <p:pic>
+              <p:nvPicPr>
+                <p:cNvPr id="39" name="그림 38">
+                  <a:extLst>
+                    <a:ext uri="{FF2B5EF4-FFF2-40B4-BE49-F238E27FC236}">
+                      <a16:creationId xmlns:a16="http://schemas.microsoft.com/office/drawing/2014/main" id="{5EE38CE3-EF3F-4EF6-8830-D0C6A0DE1D66}"/>
+                    </a:ext>
+                  </a:extLst>
+                </p:cNvPr>
+                <p:cNvPicPr>
+                  <a:picLocks noChangeAspect="1"/>
+                </p:cNvPicPr>
+                <p:nvPr/>
+              </p:nvPicPr>
+              <p:blipFill>
+                <a:blip r:embed="rId3"/>
+                <a:stretch>
+                  <a:fillRect/>
+                </a:stretch>
+              </p:blipFill>
+              <p:spPr>
+                <a:xfrm>
+                  <a:off x="12766429" y="5079033"/>
+                  <a:ext cx="2497328" cy="5267317"/>
+                </a:xfrm>
+                <a:prstGeom prst="rect">
+                  <a:avLst/>
+                </a:prstGeom>
+              </p:spPr>
+            </p:pic>
+          </p:grpSp>
+          <p:pic>
+            <p:nvPicPr>
+              <p:cNvPr id="18" name="그림 17"/>
+              <p:cNvPicPr>
+                <a:picLocks noChangeAspect="1"/>
+              </p:cNvPicPr>
+              <p:nvPr/>
+            </p:nvPicPr>
+            <p:blipFill>
+              <a:blip r:embed="rId4"/>
+              <a:stretch>
+                <a:fillRect/>
+              </a:stretch>
+            </p:blipFill>
+            <p:spPr>
+              <a:xfrm>
+                <a:off x="6704553" y="8478913"/>
+                <a:ext cx="8559204" cy="3228351"/>
+              </a:xfrm>
+              <a:prstGeom prst="rect">
+                <a:avLst/>
+              </a:prstGeom>
+            </p:spPr>
+          </p:pic>
+        </p:grpSp>
+        <p:sp>
+          <p:nvSpPr>
+            <p:cNvPr id="42" name="직사각형 41">
+              <a:extLst>
+                <a:ext uri="{FF2B5EF4-FFF2-40B4-BE49-F238E27FC236}">
+                  <a16:creationId xmlns:a16="http://schemas.microsoft.com/office/drawing/2014/main" id="{A9E92B43-A7B2-4502-87E9-BAA30D66651B}"/>
+                </a:ext>
+              </a:extLst>
+            </p:cNvPr>
+            <p:cNvSpPr/>
+            <p:nvPr/>
+          </p:nvSpPr>
+          <p:spPr>
+            <a:xfrm>
+              <a:off x="9753543" y="6277169"/>
+              <a:ext cx="998989" cy="432048"/>
+            </a:xfrm>
+            <a:prstGeom prst="rect">
+              <a:avLst/>
+            </a:prstGeom>
+            <a:noFill/>
+            <a:ln>
+              <a:noFill/>
+            </a:ln>
+          </p:spPr>
+          <p:style>
+            <a:lnRef idx="2">
+              <a:schemeClr val="accent1">
+                <a:shade val="50000"/>
+              </a:schemeClr>
+            </a:lnRef>
+            <a:fillRef idx="1">
+              <a:schemeClr val="accent1"/>
+            </a:fillRef>
+            <a:effectRef idx="0">
+              <a:schemeClr val="accent1"/>
+            </a:effectRef>
+            <a:fontRef idx="minor">
+              <a:schemeClr val="lt1"/>
+            </a:fontRef>
+          </p:style>
+          <p:txBody>
+            <a:bodyPr lIns="0" tIns="0" rIns="0" bIns="0" rtlCol="0" anchor="ctr"/>
+            <a:lstStyle/>
+            <a:p>
+              <a:pPr algn="ctr"/>
+              <a:r>
+                <a:rPr lang="ko-KR" altLang="en-US" sz="1400" b="1" smtClean="0">
+                  <a:solidFill>
+                    <a:schemeClr val="bg1"/>
+                  </a:solidFill>
+                </a:rPr>
+                <a:t>휴대폰</a:t>
+              </a:r>
+              <a:endParaRPr lang="en-US" altLang="ko-KR" sz="1400" b="1" smtClean="0">
+                <a:solidFill>
+                  <a:schemeClr val="bg1"/>
+                </a:solidFill>
+              </a:endParaRPr>
+            </a:p>
+            <a:p>
+              <a:pPr algn="ctr"/>
+              <a:r>
+                <a:rPr lang="ko-KR" altLang="en-US" sz="1400" b="1" smtClean="0">
+                  <a:solidFill>
+                    <a:schemeClr val="bg1"/>
+                  </a:solidFill>
+                </a:rPr>
+                <a:t>로그인</a:t>
+              </a:r>
+              <a:endParaRPr lang="ko-KR" altLang="en-US" sz="1400" b="1">
+                <a:solidFill>
+                  <a:schemeClr val="bg1"/>
+                </a:solidFill>
+              </a:endParaRPr>
+            </a:p>
+          </p:txBody>
+        </p:sp>
+        <p:sp>
+          <p:nvSpPr>
+            <p:cNvPr id="43" name="직사각형 42">
+              <a:extLst>
+                <a:ext uri="{FF2B5EF4-FFF2-40B4-BE49-F238E27FC236}">
+                  <a16:creationId xmlns:a16="http://schemas.microsoft.com/office/drawing/2014/main" id="{A9E92B43-A7B2-4502-87E9-BAA30D66651B}"/>
+                </a:ext>
+              </a:extLst>
+            </p:cNvPr>
+            <p:cNvSpPr/>
+            <p:nvPr/>
+          </p:nvSpPr>
+          <p:spPr>
+            <a:xfrm>
+              <a:off x="8893252" y="5499927"/>
+              <a:ext cx="731369" cy="432048"/>
+            </a:xfrm>
+            <a:prstGeom prst="rect">
+              <a:avLst/>
+            </a:prstGeom>
+            <a:noFill/>
+            <a:ln>
+              <a:noFill/>
+            </a:ln>
+          </p:spPr>
+          <p:style>
+            <a:lnRef idx="2">
+              <a:schemeClr val="accent1">
+                <a:shade val="50000"/>
+              </a:schemeClr>
+            </a:lnRef>
+            <a:fillRef idx="1">
+              <a:schemeClr val="accent1"/>
+            </a:fillRef>
+            <a:effectRef idx="0">
+              <a:schemeClr val="accent1"/>
+            </a:effectRef>
+            <a:fontRef idx="minor">
+              <a:schemeClr val="lt1"/>
+            </a:fontRef>
+          </p:style>
+          <p:txBody>
+            <a:bodyPr lIns="0" tIns="0" rIns="0" bIns="0" rtlCol="0" anchor="ctr"/>
+            <a:lstStyle/>
+            <a:p>
+              <a:pPr algn="ctr"/>
+              <a:r>
+                <a:rPr lang="en-US" altLang="ko-KR" sz="1400" b="1" smtClean="0">
+                  <a:solidFill>
+                    <a:schemeClr val="bg1"/>
+                  </a:solidFill>
+                </a:rPr>
+                <a:t>PC</a:t>
+              </a:r>
+            </a:p>
+            <a:p>
+              <a:pPr algn="ctr"/>
+              <a:r>
+                <a:rPr lang="ko-KR" altLang="en-US" sz="1400" b="1" smtClean="0">
+                  <a:solidFill>
+                    <a:schemeClr val="bg1"/>
+                  </a:solidFill>
+                </a:rPr>
+                <a:t>로그인</a:t>
+              </a:r>
+              <a:endParaRPr lang="ko-KR" altLang="en-US" sz="1400" b="1">
+                <a:solidFill>
+                  <a:schemeClr val="bg1"/>
                 </a:solidFill>
               </a:endParaRPr>
             </a:p>

</xml_diff>